<commit_message>
Update presentation and codes
</commit_message>
<xml_diff>
--- a/Presentations/3A - Multigroup comparisons.pptx
+++ b/Presentations/3A - Multigroup comparisons.pptx
@@ -236,7 +236,7 @@
               <a:rPr lang="en-US" smtClean="0">
                 <a:latin typeface="Arial"/>
               </a:rPr>
-              <a:t>12/27/2024</a:t>
+              <a:t>1/10/25</a:t>
             </a:fld>
             <a:endParaRPr lang="en-US" dirty="0">
               <a:latin typeface="Arial"/>
@@ -415,7 +415,7 @@
             <a:fld id="{D0B6771E-1346-9143-B102-CAB35990CCFA}" type="datetimeFigureOut">
               <a:rPr lang="en-US" smtClean="0"/>
               <a:pPr/>
-              <a:t>12/27/2024</a:t>
+              <a:t>1/10/25</a:t>
             </a:fld>
             <a:endParaRPr lang="en-US" dirty="0"/>
           </a:p>
@@ -10325,7 +10325,7 @@
         <p:spPr>
           <a:xfrm>
             <a:off x="133350" y="3060700"/>
-            <a:ext cx="2929200" cy="400110"/>
+            <a:ext cx="2892843" cy="400110"/>
           </a:xfrm>
           <a:prstGeom prst="rect">
             <a:avLst/>
@@ -10346,7 +10346,7 @@
                 <a:latin typeface="Arial Nova" panose="020B0504020202020204" pitchFamily="34" charset="0"/>
                 <a:cs typeface="Arial" panose="020B0604020202020204" pitchFamily="34" charset="0"/>
               </a:rPr>
-              <a:t>Friday, 03 January 2025</a:t>
+              <a:t>Friday, 10 January 2025</a:t>
             </a:r>
           </a:p>
         </p:txBody>
@@ -15801,6 +15801,15 @@
 </file>
 
 <file path=customXml/item1.xml><?xml version="1.0" encoding="utf-8"?>
+<p:properties xmlns:p="http://schemas.microsoft.com/office/2006/metadata/properties" xmlns:xsi="http://www.w3.org/2001/XMLSchema-instance" xmlns:pc="http://schemas.microsoft.com/office/infopath/2007/PartnerControls">
+  <documentManagement>
+    <PublishingExpirationDate xmlns="http://schemas.microsoft.com/sharepoint/v3" xsi:nil="true"/>
+    <PublishingStartDate xmlns="http://schemas.microsoft.com/sharepoint/v3" xsi:nil="true"/>
+  </documentManagement>
+</p:properties>
+</file>
+
+<file path=customXml/item2.xml><?xml version="1.0" encoding="utf-8"?>
 <ct:contentTypeSchema xmlns:ct="http://schemas.microsoft.com/office/2006/metadata/contentType" xmlns:ma="http://schemas.microsoft.com/office/2006/metadata/properties/metaAttributes" ct:_="" ma:_="" ma:contentTypeName="Document" ma:contentTypeID="0x010100FAE8EF9B5484074A9AD6AE3ECE890B10" ma:contentTypeVersion="1" ma:contentTypeDescription="Create a new document." ma:contentTypeScope="" ma:versionID="e3ebee926d0fba3772ddfd6cf3762369">
   <xsd:schema xmlns:xsd="http://www.w3.org/2001/XMLSchema" xmlns:xs="http://www.w3.org/2001/XMLSchema" xmlns:p="http://schemas.microsoft.com/office/2006/metadata/properties" xmlns:ns1="http://schemas.microsoft.com/sharepoint/v3" targetNamespace="http://schemas.microsoft.com/office/2006/metadata/properties" ma:root="true" ma:fieldsID="a447206dab0015f8b9f8924535193e8c" ns1:_="">
     <xsd:import namespace="http://schemas.microsoft.com/sharepoint/v3"/>
@@ -15932,15 +15941,6 @@
 </ct:contentTypeSchema>
 </file>
 
-<file path=customXml/item2.xml><?xml version="1.0" encoding="utf-8"?>
-<p:properties xmlns:p="http://schemas.microsoft.com/office/2006/metadata/properties" xmlns:xsi="http://www.w3.org/2001/XMLSchema-instance" xmlns:pc="http://schemas.microsoft.com/office/infopath/2007/PartnerControls">
-  <documentManagement>
-    <PublishingExpirationDate xmlns="http://schemas.microsoft.com/sharepoint/v3" xsi:nil="true"/>
-    <PublishingStartDate xmlns="http://schemas.microsoft.com/sharepoint/v3" xsi:nil="true"/>
-  </documentManagement>
-</p:properties>
-</file>
-
 <file path=customXml/item3.xml><?xml version="1.0" encoding="utf-8"?>
 <?mso-contentType ?>
 <FormTemplates xmlns="http://schemas.microsoft.com/sharepoint/v3/contenttype/forms">
@@ -15951,6 +15951,16 @@
 </file>
 
 <file path=customXml/itemProps1.xml><?xml version="1.0" encoding="utf-8"?>
+<ds:datastoreItem xmlns:ds="http://schemas.openxmlformats.org/officeDocument/2006/customXml" ds:itemID="{F2E3C980-C590-44A7-B970-BBC4E6ABA5CF}">
+  <ds:schemaRefs>
+    <ds:schemaRef ds:uri="http://schemas.microsoft.com/office/2006/metadata/properties"/>
+    <ds:schemaRef ds:uri="http://schemas.microsoft.com/office/infopath/2007/PartnerControls"/>
+    <ds:schemaRef ds:uri="http://schemas.microsoft.com/sharepoint/v3"/>
+  </ds:schemaRefs>
+</ds:datastoreItem>
+</file>
+
+<file path=customXml/itemProps2.xml><?xml version="1.0" encoding="utf-8"?>
 <ds:datastoreItem xmlns:ds="http://schemas.openxmlformats.org/officeDocument/2006/customXml" ds:itemID="{8F971539-B776-48D0-B41E-084723CFE5E8}">
   <ds:schemaRefs>
     <ds:schemaRef ds:uri="http://schemas.microsoft.com/office/2006/metadata/contentType"/>
@@ -15968,16 +15978,6 @@
 </ds:datastoreItem>
 </file>
 
-<file path=customXml/itemProps2.xml><?xml version="1.0" encoding="utf-8"?>
-<ds:datastoreItem xmlns:ds="http://schemas.openxmlformats.org/officeDocument/2006/customXml" ds:itemID="{F2E3C980-C590-44A7-B970-BBC4E6ABA5CF}">
-  <ds:schemaRefs>
-    <ds:schemaRef ds:uri="http://schemas.microsoft.com/office/2006/metadata/properties"/>
-    <ds:schemaRef ds:uri="http://schemas.microsoft.com/office/infopath/2007/PartnerControls"/>
-    <ds:schemaRef ds:uri="http://schemas.microsoft.com/sharepoint/v3"/>
-  </ds:schemaRefs>
-</ds:datastoreItem>
-</file>
-
 <file path=customXml/itemProps3.xml><?xml version="1.0" encoding="utf-8"?>
 <ds:datastoreItem xmlns:ds="http://schemas.openxmlformats.org/officeDocument/2006/customXml" ds:itemID="{F845859A-C588-4588-AB1B-0F629E367C93}">
   <ds:schemaRefs>

</xml_diff>

<commit_message>
Upload updated R code and Presentation
</commit_message>
<xml_diff>
--- a/Presentations/3A - Multigroup comparisons.pptx
+++ b/Presentations/3A - Multigroup comparisons.pptx
@@ -8,10 +8,10 @@
     <p:sldMasterId id="2147483709" r:id="rId7"/>
   </p:sldMasterIdLst>
   <p:notesMasterIdLst>
-    <p:notesMasterId r:id="rId24"/>
+    <p:notesMasterId r:id="rId27"/>
   </p:notesMasterIdLst>
   <p:handoutMasterIdLst>
-    <p:handoutMasterId r:id="rId25"/>
+    <p:handoutMasterId r:id="rId28"/>
   </p:handoutMasterIdLst>
   <p:sldIdLst>
     <p:sldId id="291" r:id="rId8"/>
@@ -28,8 +28,11 @@
     <p:sldId id="345" r:id="rId19"/>
     <p:sldId id="346" r:id="rId20"/>
     <p:sldId id="347" r:id="rId21"/>
-    <p:sldId id="348" r:id="rId22"/>
-    <p:sldId id="279" r:id="rId23"/>
+    <p:sldId id="349" r:id="rId22"/>
+    <p:sldId id="350" r:id="rId23"/>
+    <p:sldId id="351" r:id="rId24"/>
+    <p:sldId id="348" r:id="rId25"/>
+    <p:sldId id="279" r:id="rId26"/>
   </p:sldIdLst>
   <p:sldSz cx="9144000" cy="5143500" type="screen16x9"/>
   <p:notesSz cx="6858000" cy="9144000"/>
@@ -236,7 +239,7 @@
               <a:rPr lang="en-US" smtClean="0">
                 <a:latin typeface="Arial"/>
               </a:rPr>
-              <a:t>1/10/25</a:t>
+              <a:t>1/16/25</a:t>
             </a:fld>
             <a:endParaRPr lang="en-US" dirty="0">
               <a:latin typeface="Arial"/>
@@ -415,7 +418,7 @@
             <a:fld id="{D0B6771E-1346-9143-B102-CAB35990CCFA}" type="datetimeFigureOut">
               <a:rPr lang="en-US" smtClean="0"/>
               <a:pPr/>
-              <a:t>1/10/25</a:t>
+              <a:t>1/16/25</a:t>
             </a:fld>
             <a:endParaRPr lang="en-US" dirty="0"/>
           </a:p>
@@ -10346,7 +10349,7 @@
                 <a:latin typeface="Arial Nova" panose="020B0504020202020204" pitchFamily="34" charset="0"/>
                 <a:cs typeface="Arial" panose="020B0604020202020204" pitchFamily="34" charset="0"/>
               </a:rPr>
-              <a:t>Friday, 10 January 2025</a:t>
+              <a:t>Friday, 16 January 2025</a:t>
             </a:r>
           </a:p>
         </p:txBody>
@@ -12272,6 +12275,1034 @@
   <p:cSld>
     <p:spTree>
       <p:nvGrpSpPr>
+        <p:cNvPr id="1" name="">
+          <a:extLst>
+            <a:ext uri="{FF2B5EF4-FFF2-40B4-BE49-F238E27FC236}">
+              <a16:creationId xmlns:a16="http://schemas.microsoft.com/office/drawing/2014/main" id="{2DFC39E7-483B-0464-6EE9-9BD918AD2B37}"/>
+            </a:ext>
+          </a:extLst>
+        </p:cNvPr>
+        <p:cNvGrpSpPr/>
+        <p:nvPr/>
+      </p:nvGrpSpPr>
+      <p:grpSpPr>
+        <a:xfrm>
+          <a:off x="0" y="0"/>
+          <a:ext cx="0" cy="0"/>
+          <a:chOff x="0" y="0"/>
+          <a:chExt cx="0" cy="0"/>
+        </a:xfrm>
+      </p:grpSpPr>
+      <p:sp>
+        <p:nvSpPr>
+          <p:cNvPr id="9" name="TextBox 8">
+            <a:extLst>
+              <a:ext uri="{FF2B5EF4-FFF2-40B4-BE49-F238E27FC236}">
+                <a16:creationId xmlns:a16="http://schemas.microsoft.com/office/drawing/2014/main" id="{D0AC8ACB-DF8C-B533-6259-E0B1607C263B}"/>
+              </a:ext>
+            </a:extLst>
+          </p:cNvPr>
+          <p:cNvSpPr txBox="1"/>
+          <p:nvPr/>
+        </p:nvSpPr>
+        <p:spPr>
+          <a:xfrm>
+            <a:off x="304800" y="1158508"/>
+            <a:ext cx="6896100" cy="400110"/>
+          </a:xfrm>
+          <a:prstGeom prst="rect">
+            <a:avLst/>
+          </a:prstGeom>
+          <a:noFill/>
+        </p:spPr>
+        <p:txBody>
+          <a:bodyPr wrap="square">
+            <a:spAutoFit/>
+          </a:bodyPr>
+          <a:lstStyle/>
+          <a:p>
+            <a:pPr marL="0" indent="0">
+              <a:spcAft>
+                <a:spcPts val="600"/>
+              </a:spcAft>
+              <a:buNone/>
+            </a:pPr>
+            <a:r>
+              <a:rPr lang="en-US" sz="2000" dirty="0">
+                <a:solidFill>
+                  <a:schemeClr val="bg1"/>
+                </a:solidFill>
+                <a:latin typeface="Arial Nova" panose="020B0504020202020204" pitchFamily="34" charset="0"/>
+                <a:cs typeface="Arial" panose="020B0604020202020204" pitchFamily="34" charset="0"/>
+              </a:rPr>
+              <a:t>Row versus columns</a:t>
+            </a:r>
+            <a:endParaRPr lang="en-US" dirty="0">
+              <a:solidFill>
+                <a:schemeClr val="bg1"/>
+              </a:solidFill>
+              <a:latin typeface="Arial Nova" panose="020B0504020202020204" pitchFamily="34" charset="0"/>
+              <a:cs typeface="Arial" panose="020B0604020202020204" pitchFamily="34" charset="0"/>
+            </a:endParaRPr>
+          </a:p>
+        </p:txBody>
+      </p:sp>
+      <p:sp>
+        <p:nvSpPr>
+          <p:cNvPr id="4" name="Title 2">
+            <a:extLst>
+              <a:ext uri="{FF2B5EF4-FFF2-40B4-BE49-F238E27FC236}">
+                <a16:creationId xmlns:a16="http://schemas.microsoft.com/office/drawing/2014/main" id="{FDB558D6-BECD-FFEB-1E21-C0231EDD80E6}"/>
+              </a:ext>
+            </a:extLst>
+          </p:cNvPr>
+          <p:cNvSpPr>
+            <a:spLocks noGrp="1"/>
+          </p:cNvSpPr>
+          <p:nvPr>
+            <p:ph type="ctrTitle"/>
+          </p:nvPr>
+        </p:nvSpPr>
+        <p:spPr>
+          <a:xfrm>
+            <a:off x="165100" y="188158"/>
+            <a:ext cx="8717214" cy="608855"/>
+          </a:xfrm>
+        </p:spPr>
+        <p:txBody>
+          <a:bodyPr/>
+          <a:lstStyle/>
+          <a:p>
+            <a:pPr>
+              <a:lnSpc>
+                <a:spcPct val="100000"/>
+              </a:lnSpc>
+            </a:pPr>
+            <a:r>
+              <a:rPr lang="en-US" dirty="0">
+                <a:latin typeface="Arial Nova" panose="020B0504020202020204" pitchFamily="34" charset="0"/>
+              </a:rPr>
+              <a:t>R x C analysis</a:t>
+            </a:r>
+          </a:p>
+        </p:txBody>
+      </p:sp>
+      <p:graphicFrame>
+        <p:nvGraphicFramePr>
+          <p:cNvPr id="2" name="Table 1">
+            <a:extLst>
+              <a:ext uri="{FF2B5EF4-FFF2-40B4-BE49-F238E27FC236}">
+                <a16:creationId xmlns:a16="http://schemas.microsoft.com/office/drawing/2014/main" id="{EB1189B1-52C5-3DD7-6C18-80B89A511E4A}"/>
+              </a:ext>
+            </a:extLst>
+          </p:cNvPr>
+          <p:cNvGraphicFramePr>
+            <a:graphicFrameLocks noGrp="1"/>
+          </p:cNvGraphicFramePr>
+          <p:nvPr>
+            <p:extLst>
+              <p:ext uri="{D42A27DB-BD31-4B8C-83A1-F6EECF244321}">
+                <p14:modId xmlns:p14="http://schemas.microsoft.com/office/powerpoint/2010/main" val="3985296302"/>
+              </p:ext>
+            </p:extLst>
+          </p:nvPr>
+        </p:nvGraphicFramePr>
+        <p:xfrm>
+          <a:off x="395052" y="2010082"/>
+          <a:ext cx="7901050" cy="2080904"/>
+        </p:xfrm>
+        <a:graphic>
+          <a:graphicData uri="http://schemas.openxmlformats.org/drawingml/2006/table">
+            <a:tbl>
+              <a:tblPr firstRow="1" bandRow="1">
+                <a:tableStyleId>{5C22544A-7EE6-4342-B048-85BDC9FD1C3A}</a:tableStyleId>
+              </a:tblPr>
+              <a:tblGrid>
+                <a:gridCol w="1580210">
+                  <a:extLst>
+                    <a:ext uri="{9D8B030D-6E8A-4147-A177-3AD203B41FA5}">
+                      <a16:colId xmlns:a16="http://schemas.microsoft.com/office/drawing/2014/main" val="3394098848"/>
+                    </a:ext>
+                  </a:extLst>
+                </a:gridCol>
+                <a:gridCol w="1580210">
+                  <a:extLst>
+                    <a:ext uri="{9D8B030D-6E8A-4147-A177-3AD203B41FA5}">
+                      <a16:colId xmlns:a16="http://schemas.microsoft.com/office/drawing/2014/main" val="3074355115"/>
+                    </a:ext>
+                  </a:extLst>
+                </a:gridCol>
+                <a:gridCol w="1580210">
+                  <a:extLst>
+                    <a:ext uri="{9D8B030D-6E8A-4147-A177-3AD203B41FA5}">
+                      <a16:colId xmlns:a16="http://schemas.microsoft.com/office/drawing/2014/main" val="1218639213"/>
+                    </a:ext>
+                  </a:extLst>
+                </a:gridCol>
+                <a:gridCol w="1580210">
+                  <a:extLst>
+                    <a:ext uri="{9D8B030D-6E8A-4147-A177-3AD203B41FA5}">
+                      <a16:colId xmlns:a16="http://schemas.microsoft.com/office/drawing/2014/main" val="3123911379"/>
+                    </a:ext>
+                  </a:extLst>
+                </a:gridCol>
+                <a:gridCol w="1580210">
+                  <a:extLst>
+                    <a:ext uri="{9D8B030D-6E8A-4147-A177-3AD203B41FA5}">
+                      <a16:colId xmlns:a16="http://schemas.microsoft.com/office/drawing/2014/main" val="1151783437"/>
+                    </a:ext>
+                  </a:extLst>
+                </a:gridCol>
+              </a:tblGrid>
+              <a:tr h="403791">
+                <a:tc>
+                  <a:txBody>
+                    <a:bodyPr/>
+                    <a:lstStyle/>
+                    <a:p>
+                      <a:pPr algn="ctr"/>
+                      <a:endParaRPr lang="en-US" dirty="0"/>
+                    </a:p>
+                  </a:txBody>
+                  <a:tcPr anchor="ctr"/>
+                </a:tc>
+                <a:tc>
+                  <a:txBody>
+                    <a:bodyPr/>
+                    <a:lstStyle/>
+                    <a:p>
+                      <a:pPr algn="ctr"/>
+                      <a:r>
+                        <a:rPr lang="en-US" dirty="0"/>
+                        <a:t>Age</a:t>
+                      </a:r>
+                    </a:p>
+                    <a:p>
+                      <a:pPr algn="ctr"/>
+                      <a:r>
+                        <a:rPr lang="en-US" dirty="0"/>
+                        <a:t>(20-29 years)</a:t>
+                      </a:r>
+                    </a:p>
+                    <a:p>
+                      <a:pPr algn="ctr"/>
+                      <a:r>
+                        <a:rPr lang="en-US" dirty="0"/>
+                        <a:t>N (%)</a:t>
+                      </a:r>
+                    </a:p>
+                  </a:txBody>
+                  <a:tcPr anchor="ctr"/>
+                </a:tc>
+                <a:tc>
+                  <a:txBody>
+                    <a:bodyPr/>
+                    <a:lstStyle/>
+                    <a:p>
+                      <a:pPr algn="ctr"/>
+                      <a:r>
+                        <a:rPr lang="en-US" dirty="0"/>
+                        <a:t>Age</a:t>
+                      </a:r>
+                    </a:p>
+                    <a:p>
+                      <a:pPr algn="ctr"/>
+                      <a:r>
+                        <a:rPr lang="en-US" dirty="0"/>
+                        <a:t>(30-39 years)</a:t>
+                      </a:r>
+                    </a:p>
+                    <a:p>
+                      <a:pPr algn="ctr"/>
+                      <a:r>
+                        <a:rPr lang="en-US" dirty="0"/>
+                        <a:t>N (%)</a:t>
+                      </a:r>
+                    </a:p>
+                  </a:txBody>
+                  <a:tcPr anchor="ctr"/>
+                </a:tc>
+                <a:tc>
+                  <a:txBody>
+                    <a:bodyPr/>
+                    <a:lstStyle/>
+                    <a:p>
+                      <a:pPr algn="ctr"/>
+                      <a:r>
+                        <a:rPr lang="en-US" dirty="0"/>
+                        <a:t>Age</a:t>
+                      </a:r>
+                    </a:p>
+                    <a:p>
+                      <a:pPr algn="ctr"/>
+                      <a:r>
+                        <a:rPr lang="en-US" dirty="0"/>
+                        <a:t>(40+ years)</a:t>
+                      </a:r>
+                    </a:p>
+                    <a:p>
+                      <a:pPr algn="ctr"/>
+                      <a:r>
+                        <a:rPr lang="en-US" dirty="0"/>
+                        <a:t>N (%)</a:t>
+                      </a:r>
+                    </a:p>
+                  </a:txBody>
+                  <a:tcPr anchor="ctr"/>
+                </a:tc>
+                <a:tc>
+                  <a:txBody>
+                    <a:bodyPr/>
+                    <a:lstStyle/>
+                    <a:p>
+                      <a:pPr algn="ctr"/>
+                      <a:r>
+                        <a:rPr lang="en-US" dirty="0"/>
+                        <a:t>Chi2 (</a:t>
+                      </a:r>
+                      <a:r>
+                        <a:rPr lang="en-US" dirty="0" err="1"/>
+                        <a:t>df</a:t>
+                      </a:r>
+                      <a:r>
+                        <a:rPr lang="en-US" dirty="0"/>
+                        <a:t>)</a:t>
+                      </a:r>
+                    </a:p>
+                    <a:p>
+                      <a:pPr algn="ctr"/>
+                      <a:r>
+                        <a:rPr lang="en-US" dirty="0"/>
+                        <a:t>P-value</a:t>
+                      </a:r>
+                    </a:p>
+                  </a:txBody>
+                  <a:tcPr anchor="ctr"/>
+                </a:tc>
+                <a:extLst>
+                  <a:ext uri="{0D108BD9-81ED-4DB2-BD59-A6C34878D82A}">
+                    <a16:rowId xmlns:a16="http://schemas.microsoft.com/office/drawing/2014/main" val="3020653297"/>
+                  </a:ext>
+                </a:extLst>
+              </a:tr>
+              <a:tr h="374189">
+                <a:tc>
+                  <a:txBody>
+                    <a:bodyPr/>
+                    <a:lstStyle/>
+                    <a:p>
+                      <a:pPr algn="ctr"/>
+                      <a:r>
+                        <a:rPr lang="en-US" dirty="0"/>
+                        <a:t>&lt;28 kg / m2</a:t>
+                      </a:r>
+                    </a:p>
+                  </a:txBody>
+                  <a:tcPr anchor="ctr"/>
+                </a:tc>
+                <a:tc>
+                  <a:txBody>
+                    <a:bodyPr/>
+                    <a:lstStyle/>
+                    <a:p>
+                      <a:pPr algn="ctr"/>
+                      <a:r>
+                        <a:rPr lang="en-US" dirty="0"/>
+                        <a:t>135 (34.1%)</a:t>
+                      </a:r>
+                    </a:p>
+                  </a:txBody>
+                  <a:tcPr anchor="ctr"/>
+                </a:tc>
+                <a:tc>
+                  <a:txBody>
+                    <a:bodyPr/>
+                    <a:lstStyle/>
+                    <a:p>
+                      <a:pPr algn="ctr"/>
+                      <a:r>
+                        <a:rPr lang="en-US" dirty="0"/>
+                        <a:t>39 (23.6%)</a:t>
+                      </a:r>
+                    </a:p>
+                  </a:txBody>
+                  <a:tcPr anchor="ctr"/>
+                </a:tc>
+                <a:tc>
+                  <a:txBody>
+                    <a:bodyPr/>
+                    <a:lstStyle/>
+                    <a:p>
+                      <a:pPr algn="ctr"/>
+                      <a:r>
+                        <a:rPr lang="en-US" dirty="0"/>
+                        <a:t>50 (24.2%)</a:t>
+                      </a:r>
+                    </a:p>
+                  </a:txBody>
+                  <a:tcPr anchor="ctr"/>
+                </a:tc>
+                <a:tc rowSpan="4">
+                  <a:txBody>
+                    <a:bodyPr/>
+                    <a:lstStyle/>
+                    <a:p>
+                      <a:pPr algn="ctr"/>
+                      <a:r>
+                        <a:rPr lang="en-US" dirty="0"/>
+                        <a:t>Chi2 = 15.82 (6)</a:t>
+                      </a:r>
+                    </a:p>
+                    <a:p>
+                      <a:pPr algn="ctr"/>
+                      <a:r>
+                        <a:rPr lang="en-US" dirty="0"/>
+                        <a:t>P = 0.015</a:t>
+                      </a:r>
+                    </a:p>
+                  </a:txBody>
+                  <a:tcPr anchor="ctr"/>
+                </a:tc>
+                <a:extLst>
+                  <a:ext uri="{0D108BD9-81ED-4DB2-BD59-A6C34878D82A}">
+                    <a16:rowId xmlns:a16="http://schemas.microsoft.com/office/drawing/2014/main" val="1157857996"/>
+                  </a:ext>
+                </a:extLst>
+              </a:tr>
+              <a:tr h="403791">
+                <a:tc>
+                  <a:txBody>
+                    <a:bodyPr/>
+                    <a:lstStyle/>
+                    <a:p>
+                      <a:pPr algn="ctr"/>
+                      <a:r>
+                        <a:rPr lang="en-US" dirty="0"/>
+                        <a:t>28 to &lt; 32 kg / m2</a:t>
+                      </a:r>
+                    </a:p>
+                  </a:txBody>
+                  <a:tcPr anchor="ctr"/>
+                </a:tc>
+                <a:tc>
+                  <a:txBody>
+                    <a:bodyPr/>
+                    <a:lstStyle/>
+                    <a:p>
+                      <a:pPr algn="ctr"/>
+                      <a:r>
+                        <a:rPr lang="en-US" dirty="0"/>
+                        <a:t>75 (18.9%)</a:t>
+                      </a:r>
+                    </a:p>
+                  </a:txBody>
+                  <a:tcPr anchor="ctr"/>
+                </a:tc>
+                <a:tc>
+                  <a:txBody>
+                    <a:bodyPr/>
+                    <a:lstStyle/>
+                    <a:p>
+                      <a:pPr algn="ctr"/>
+                      <a:r>
+                        <a:rPr lang="en-US" dirty="0"/>
+                        <a:t>40 (24.2%)</a:t>
+                      </a:r>
+                    </a:p>
+                  </a:txBody>
+                  <a:tcPr anchor="ctr"/>
+                </a:tc>
+                <a:tc>
+                  <a:txBody>
+                    <a:bodyPr/>
+                    <a:lstStyle/>
+                    <a:p>
+                      <a:pPr algn="ctr"/>
+                      <a:r>
+                        <a:rPr lang="en-US" dirty="0"/>
+                        <a:t>34 (16.4%)</a:t>
+                      </a:r>
+                    </a:p>
+                  </a:txBody>
+                  <a:tcPr anchor="ctr"/>
+                </a:tc>
+                <a:tc vMerge="1">
+                  <a:txBody>
+                    <a:bodyPr/>
+                    <a:lstStyle/>
+                    <a:p>
+                      <a:pPr algn="ctr"/>
+                      <a:endParaRPr lang="en-US" dirty="0"/>
+                    </a:p>
+                  </a:txBody>
+                  <a:tcPr anchor="ctr"/>
+                </a:tc>
+                <a:extLst>
+                  <a:ext uri="{0D108BD9-81ED-4DB2-BD59-A6C34878D82A}">
+                    <a16:rowId xmlns:a16="http://schemas.microsoft.com/office/drawing/2014/main" val="216139847"/>
+                  </a:ext>
+                </a:extLst>
+              </a:tr>
+              <a:tr h="374189">
+                <a:tc>
+                  <a:txBody>
+                    <a:bodyPr/>
+                    <a:lstStyle/>
+                    <a:p>
+                      <a:pPr algn="ctr"/>
+                      <a:r>
+                        <a:rPr lang="en-US" dirty="0"/>
+                        <a:t>32 to &lt; 37 kg / m2</a:t>
+                      </a:r>
+                    </a:p>
+                  </a:txBody>
+                  <a:tcPr anchor="ctr"/>
+                </a:tc>
+                <a:tc>
+                  <a:txBody>
+                    <a:bodyPr/>
+                    <a:lstStyle/>
+                    <a:p>
+                      <a:pPr algn="ctr"/>
+                      <a:r>
+                        <a:rPr lang="en-US" dirty="0"/>
+                        <a:t>96 (24.2%)</a:t>
+                      </a:r>
+                    </a:p>
+                  </a:txBody>
+                  <a:tcPr anchor="ctr"/>
+                </a:tc>
+                <a:tc>
+                  <a:txBody>
+                    <a:bodyPr/>
+                    <a:lstStyle/>
+                    <a:p>
+                      <a:pPr algn="ctr"/>
+                      <a:r>
+                        <a:rPr lang="en-US" dirty="0"/>
+                        <a:t>52 (31.5%)</a:t>
+                      </a:r>
+                    </a:p>
+                  </a:txBody>
+                  <a:tcPr anchor="ctr"/>
+                </a:tc>
+                <a:tc>
+                  <a:txBody>
+                    <a:bodyPr/>
+                    <a:lstStyle/>
+                    <a:p>
+                      <a:pPr algn="ctr"/>
+                      <a:r>
+                        <a:rPr lang="en-US" dirty="0"/>
+                        <a:t>69 (33.3%)</a:t>
+                      </a:r>
+                    </a:p>
+                  </a:txBody>
+                  <a:tcPr anchor="ctr"/>
+                </a:tc>
+                <a:tc vMerge="1">
+                  <a:txBody>
+                    <a:bodyPr/>
+                    <a:lstStyle/>
+                    <a:p>
+                      <a:pPr algn="ctr"/>
+                      <a:endParaRPr lang="en-US" dirty="0"/>
+                    </a:p>
+                  </a:txBody>
+                  <a:tcPr anchor="ctr"/>
+                </a:tc>
+                <a:extLst>
+                  <a:ext uri="{0D108BD9-81ED-4DB2-BD59-A6C34878D82A}">
+                    <a16:rowId xmlns:a16="http://schemas.microsoft.com/office/drawing/2014/main" val="1845530563"/>
+                  </a:ext>
+                </a:extLst>
+              </a:tr>
+              <a:tr h="374189">
+                <a:tc>
+                  <a:txBody>
+                    <a:bodyPr/>
+                    <a:lstStyle/>
+                    <a:p>
+                      <a:pPr algn="ctr"/>
+                      <a:r>
+                        <a:rPr lang="en-US" dirty="0"/>
+                        <a:t>37 + kg / m2</a:t>
+                      </a:r>
+                    </a:p>
+                  </a:txBody>
+                  <a:tcPr anchor="ctr"/>
+                </a:tc>
+                <a:tc>
+                  <a:txBody>
+                    <a:bodyPr/>
+                    <a:lstStyle/>
+                    <a:p>
+                      <a:pPr algn="ctr"/>
+                      <a:r>
+                        <a:rPr lang="en-US" dirty="0"/>
+                        <a:t>90 (22.7%)</a:t>
+                      </a:r>
+                    </a:p>
+                  </a:txBody>
+                  <a:tcPr anchor="ctr"/>
+                </a:tc>
+                <a:tc>
+                  <a:txBody>
+                    <a:bodyPr/>
+                    <a:lstStyle/>
+                    <a:p>
+                      <a:pPr algn="ctr"/>
+                      <a:r>
+                        <a:rPr lang="en-US" dirty="0"/>
+                        <a:t>34 (19.1%)</a:t>
+                      </a:r>
+                    </a:p>
+                  </a:txBody>
+                  <a:tcPr anchor="ctr"/>
+                </a:tc>
+                <a:tc>
+                  <a:txBody>
+                    <a:bodyPr/>
+                    <a:lstStyle/>
+                    <a:p>
+                      <a:pPr algn="ctr"/>
+                      <a:r>
+                        <a:rPr lang="en-US" dirty="0"/>
+                        <a:t>54 (26.1%)</a:t>
+                      </a:r>
+                    </a:p>
+                  </a:txBody>
+                  <a:tcPr anchor="ctr"/>
+                </a:tc>
+                <a:tc vMerge="1">
+                  <a:txBody>
+                    <a:bodyPr/>
+                    <a:lstStyle/>
+                    <a:p>
+                      <a:pPr algn="ctr"/>
+                      <a:endParaRPr lang="en-US" dirty="0"/>
+                    </a:p>
+                  </a:txBody>
+                  <a:tcPr anchor="ctr"/>
+                </a:tc>
+                <a:extLst>
+                  <a:ext uri="{0D108BD9-81ED-4DB2-BD59-A6C34878D82A}">
+                    <a16:rowId xmlns:a16="http://schemas.microsoft.com/office/drawing/2014/main" val="2006518323"/>
+                  </a:ext>
+                </a:extLst>
+              </a:tr>
+            </a:tbl>
+          </a:graphicData>
+        </a:graphic>
+      </p:graphicFrame>
+    </p:spTree>
+    <p:extLst>
+      <p:ext uri="{BB962C8B-B14F-4D97-AF65-F5344CB8AC3E}">
+        <p14:creationId xmlns:p14="http://schemas.microsoft.com/office/powerpoint/2010/main" val="3797303546"/>
+      </p:ext>
+    </p:extLst>
+  </p:cSld>
+  <p:clrMapOvr>
+    <a:masterClrMapping/>
+  </p:clrMapOvr>
+</p:sld>
+</file>
+
+<file path=ppt/slides/slide16.xml><?xml version="1.0" encoding="utf-8"?>
+<p:sld xmlns:a="http://schemas.openxmlformats.org/drawingml/2006/main" xmlns:r="http://schemas.openxmlformats.org/officeDocument/2006/relationships" xmlns:p="http://schemas.openxmlformats.org/presentationml/2006/main">
+  <p:cSld>
+    <p:spTree>
+      <p:nvGrpSpPr>
+        <p:cNvPr id="1" name="">
+          <a:extLst>
+            <a:ext uri="{FF2B5EF4-FFF2-40B4-BE49-F238E27FC236}">
+              <a16:creationId xmlns:a16="http://schemas.microsoft.com/office/drawing/2014/main" id="{59287771-80A8-9BC0-527C-03704D27AEA4}"/>
+            </a:ext>
+          </a:extLst>
+        </p:cNvPr>
+        <p:cNvGrpSpPr/>
+        <p:nvPr/>
+      </p:nvGrpSpPr>
+      <p:grpSpPr>
+        <a:xfrm>
+          <a:off x="0" y="0"/>
+          <a:ext cx="0" cy="0"/>
+          <a:chOff x="0" y="0"/>
+          <a:chExt cx="0" cy="0"/>
+        </a:xfrm>
+      </p:grpSpPr>
+      <p:sp>
+        <p:nvSpPr>
+          <p:cNvPr id="9" name="TextBox 8">
+            <a:extLst>
+              <a:ext uri="{FF2B5EF4-FFF2-40B4-BE49-F238E27FC236}">
+                <a16:creationId xmlns:a16="http://schemas.microsoft.com/office/drawing/2014/main" id="{2EE0C2E1-7694-E68D-0A09-94EB57255ECA}"/>
+              </a:ext>
+            </a:extLst>
+          </p:cNvPr>
+          <p:cNvSpPr txBox="1"/>
+          <p:nvPr/>
+        </p:nvSpPr>
+        <p:spPr>
+          <a:xfrm>
+            <a:off x="321426" y="930533"/>
+            <a:ext cx="6896100" cy="400110"/>
+          </a:xfrm>
+          <a:prstGeom prst="rect">
+            <a:avLst/>
+          </a:prstGeom>
+          <a:noFill/>
+        </p:spPr>
+        <p:txBody>
+          <a:bodyPr wrap="square">
+            <a:spAutoFit/>
+          </a:bodyPr>
+          <a:lstStyle/>
+          <a:p>
+            <a:pPr marL="0" indent="0">
+              <a:spcAft>
+                <a:spcPts val="600"/>
+              </a:spcAft>
+              <a:buNone/>
+            </a:pPr>
+            <a:r>
+              <a:rPr lang="en-US" sz="2000" dirty="0">
+                <a:solidFill>
+                  <a:schemeClr val="bg1"/>
+                </a:solidFill>
+                <a:latin typeface="Arial Nova" panose="020B0504020202020204" pitchFamily="34" charset="0"/>
+                <a:cs typeface="Arial" panose="020B0604020202020204" pitchFamily="34" charset="0"/>
+              </a:rPr>
+              <a:t>Create BMI and Age categories</a:t>
+            </a:r>
+            <a:endParaRPr lang="en-US" dirty="0">
+              <a:solidFill>
+                <a:schemeClr val="bg1"/>
+              </a:solidFill>
+              <a:latin typeface="Arial Nova" panose="020B0504020202020204" pitchFamily="34" charset="0"/>
+              <a:cs typeface="Arial" panose="020B0604020202020204" pitchFamily="34" charset="0"/>
+            </a:endParaRPr>
+          </a:p>
+        </p:txBody>
+      </p:sp>
+      <p:sp>
+        <p:nvSpPr>
+          <p:cNvPr id="4" name="Title 2">
+            <a:extLst>
+              <a:ext uri="{FF2B5EF4-FFF2-40B4-BE49-F238E27FC236}">
+                <a16:creationId xmlns:a16="http://schemas.microsoft.com/office/drawing/2014/main" id="{4F2A848F-488A-4E21-6029-B96734BE25A6}"/>
+              </a:ext>
+            </a:extLst>
+          </p:cNvPr>
+          <p:cNvSpPr>
+            <a:spLocks noGrp="1"/>
+          </p:cNvSpPr>
+          <p:nvPr>
+            <p:ph type="ctrTitle"/>
+          </p:nvPr>
+        </p:nvSpPr>
+        <p:spPr>
+          <a:xfrm>
+            <a:off x="165100" y="188158"/>
+            <a:ext cx="8717214" cy="608855"/>
+          </a:xfrm>
+        </p:spPr>
+        <p:txBody>
+          <a:bodyPr/>
+          <a:lstStyle/>
+          <a:p>
+            <a:pPr>
+              <a:lnSpc>
+                <a:spcPct val="100000"/>
+              </a:lnSpc>
+            </a:pPr>
+            <a:r>
+              <a:rPr lang="en-US" dirty="0">
+                <a:latin typeface="Arial Nova" panose="020B0504020202020204" pitchFamily="34" charset="0"/>
+              </a:rPr>
+              <a:t>R x C analysis in r</a:t>
+            </a:r>
+          </a:p>
+        </p:txBody>
+      </p:sp>
+      <p:pic>
+        <p:nvPicPr>
+          <p:cNvPr id="5" name="Picture 4" descr="A computer screen shot of text&#10;&#10;AI-generated content may be incorrect.">
+            <a:extLst>
+              <a:ext uri="{FF2B5EF4-FFF2-40B4-BE49-F238E27FC236}">
+                <a16:creationId xmlns:a16="http://schemas.microsoft.com/office/drawing/2014/main" id="{37F503E3-FE08-F6BC-8BCD-197C8FCB3763}"/>
+              </a:ext>
+            </a:extLst>
+          </p:cNvPr>
+          <p:cNvPicPr>
+            <a:picLocks noChangeAspect="1"/>
+          </p:cNvPicPr>
+          <p:nvPr/>
+        </p:nvPicPr>
+        <p:blipFill>
+          <a:blip r:embed="rId2"/>
+          <a:stretch>
+            <a:fillRect/>
+          </a:stretch>
+        </p:blipFill>
+        <p:spPr>
+          <a:xfrm>
+            <a:off x="465513" y="1330643"/>
+            <a:ext cx="5365866" cy="1708052"/>
+          </a:xfrm>
+          <a:prstGeom prst="rect">
+            <a:avLst/>
+          </a:prstGeom>
+        </p:spPr>
+      </p:pic>
+      <p:pic>
+        <p:nvPicPr>
+          <p:cNvPr id="8" name="Picture 7" descr="A screenshot of a computer program&#10;&#10;AI-generated content may be incorrect.">
+            <a:extLst>
+              <a:ext uri="{FF2B5EF4-FFF2-40B4-BE49-F238E27FC236}">
+                <a16:creationId xmlns:a16="http://schemas.microsoft.com/office/drawing/2014/main" id="{F864A52A-E9B9-4315-3F27-38C41E288A6B}"/>
+              </a:ext>
+            </a:extLst>
+          </p:cNvPr>
+          <p:cNvPicPr>
+            <a:picLocks noChangeAspect="1"/>
+          </p:cNvPicPr>
+          <p:nvPr/>
+        </p:nvPicPr>
+        <p:blipFill>
+          <a:blip r:embed="rId3"/>
+          <a:stretch>
+            <a:fillRect/>
+          </a:stretch>
+        </p:blipFill>
+        <p:spPr>
+          <a:xfrm>
+            <a:off x="465513" y="3120710"/>
+            <a:ext cx="5365866" cy="1933290"/>
+          </a:xfrm>
+          <a:prstGeom prst="rect">
+            <a:avLst/>
+          </a:prstGeom>
+        </p:spPr>
+      </p:pic>
+    </p:spTree>
+    <p:extLst>
+      <p:ext uri="{BB962C8B-B14F-4D97-AF65-F5344CB8AC3E}">
+        <p14:creationId xmlns:p14="http://schemas.microsoft.com/office/powerpoint/2010/main" val="2277141070"/>
+      </p:ext>
+    </p:extLst>
+  </p:cSld>
+  <p:clrMapOvr>
+    <a:masterClrMapping/>
+  </p:clrMapOvr>
+</p:sld>
+</file>
+
+<file path=ppt/slides/slide17.xml><?xml version="1.0" encoding="utf-8"?>
+<p:sld xmlns:a="http://schemas.openxmlformats.org/drawingml/2006/main" xmlns:r="http://schemas.openxmlformats.org/officeDocument/2006/relationships" xmlns:p="http://schemas.openxmlformats.org/presentationml/2006/main">
+  <p:cSld>
+    <p:spTree>
+      <p:nvGrpSpPr>
+        <p:cNvPr id="1" name="">
+          <a:extLst>
+            <a:ext uri="{FF2B5EF4-FFF2-40B4-BE49-F238E27FC236}">
+              <a16:creationId xmlns:a16="http://schemas.microsoft.com/office/drawing/2014/main" id="{473DADB6-4C04-BC2C-4F59-8A00529AFA5A}"/>
+            </a:ext>
+          </a:extLst>
+        </p:cNvPr>
+        <p:cNvGrpSpPr/>
+        <p:nvPr/>
+      </p:nvGrpSpPr>
+      <p:grpSpPr>
+        <a:xfrm>
+          <a:off x="0" y="0"/>
+          <a:ext cx="0" cy="0"/>
+          <a:chOff x="0" y="0"/>
+          <a:chExt cx="0" cy="0"/>
+        </a:xfrm>
+      </p:grpSpPr>
+      <p:sp>
+        <p:nvSpPr>
+          <p:cNvPr id="9" name="TextBox 8">
+            <a:extLst>
+              <a:ext uri="{FF2B5EF4-FFF2-40B4-BE49-F238E27FC236}">
+                <a16:creationId xmlns:a16="http://schemas.microsoft.com/office/drawing/2014/main" id="{965B2A93-9961-DE3C-1E2C-755AD1D56DD5}"/>
+              </a:ext>
+            </a:extLst>
+          </p:cNvPr>
+          <p:cNvSpPr txBox="1"/>
+          <p:nvPr/>
+        </p:nvSpPr>
+        <p:spPr>
+          <a:xfrm>
+            <a:off x="321426" y="930533"/>
+            <a:ext cx="6896100" cy="400110"/>
+          </a:xfrm>
+          <a:prstGeom prst="rect">
+            <a:avLst/>
+          </a:prstGeom>
+          <a:noFill/>
+        </p:spPr>
+        <p:txBody>
+          <a:bodyPr wrap="square">
+            <a:spAutoFit/>
+          </a:bodyPr>
+          <a:lstStyle/>
+          <a:p>
+            <a:pPr marL="0" indent="0">
+              <a:spcAft>
+                <a:spcPts val="600"/>
+              </a:spcAft>
+              <a:buNone/>
+            </a:pPr>
+            <a:r>
+              <a:rPr lang="en-US" sz="2000" dirty="0" err="1">
+                <a:solidFill>
+                  <a:schemeClr val="bg1"/>
+                </a:solidFill>
+                <a:latin typeface="Arial Nova" panose="020B0504020202020204" pitchFamily="34" charset="0"/>
+                <a:cs typeface="Arial" panose="020B0604020202020204" pitchFamily="34" charset="0"/>
+              </a:rPr>
+              <a:t>CrossTable</a:t>
+            </a:r>
+            <a:r>
+              <a:rPr lang="en-US" sz="2000" dirty="0">
+                <a:solidFill>
+                  <a:schemeClr val="bg1"/>
+                </a:solidFill>
+                <a:latin typeface="Arial Nova" panose="020B0504020202020204" pitchFamily="34" charset="0"/>
+                <a:cs typeface="Arial" panose="020B0604020202020204" pitchFamily="34" charset="0"/>
+              </a:rPr>
+              <a:t>()</a:t>
+            </a:r>
+            <a:endParaRPr lang="en-US" dirty="0">
+              <a:solidFill>
+                <a:schemeClr val="bg1"/>
+              </a:solidFill>
+              <a:latin typeface="Arial Nova" panose="020B0504020202020204" pitchFamily="34" charset="0"/>
+              <a:cs typeface="Arial" panose="020B0604020202020204" pitchFamily="34" charset="0"/>
+            </a:endParaRPr>
+          </a:p>
+        </p:txBody>
+      </p:sp>
+      <p:sp>
+        <p:nvSpPr>
+          <p:cNvPr id="4" name="Title 2">
+            <a:extLst>
+              <a:ext uri="{FF2B5EF4-FFF2-40B4-BE49-F238E27FC236}">
+                <a16:creationId xmlns:a16="http://schemas.microsoft.com/office/drawing/2014/main" id="{C91886C6-56B3-82B3-A066-6FF39BC7362E}"/>
+              </a:ext>
+            </a:extLst>
+          </p:cNvPr>
+          <p:cNvSpPr>
+            <a:spLocks noGrp="1"/>
+          </p:cNvSpPr>
+          <p:nvPr>
+            <p:ph type="ctrTitle"/>
+          </p:nvPr>
+        </p:nvSpPr>
+        <p:spPr>
+          <a:xfrm>
+            <a:off x="165100" y="188158"/>
+            <a:ext cx="8717214" cy="608855"/>
+          </a:xfrm>
+        </p:spPr>
+        <p:txBody>
+          <a:bodyPr/>
+          <a:lstStyle/>
+          <a:p>
+            <a:pPr>
+              <a:lnSpc>
+                <a:spcPct val="100000"/>
+              </a:lnSpc>
+            </a:pPr>
+            <a:r>
+              <a:rPr lang="en-US" dirty="0">
+                <a:latin typeface="Arial Nova" panose="020B0504020202020204" pitchFamily="34" charset="0"/>
+              </a:rPr>
+              <a:t>R x C analysis in r</a:t>
+            </a:r>
+          </a:p>
+        </p:txBody>
+      </p:sp>
+      <p:pic>
+        <p:nvPicPr>
+          <p:cNvPr id="3" name="Picture 2" descr="A black screen with white text&#10;&#10;AI-generated content may be incorrect.">
+            <a:extLst>
+              <a:ext uri="{FF2B5EF4-FFF2-40B4-BE49-F238E27FC236}">
+                <a16:creationId xmlns:a16="http://schemas.microsoft.com/office/drawing/2014/main" id="{BDD7F8BE-D17C-0AAB-AD88-32A8FA999B84}"/>
+              </a:ext>
+            </a:extLst>
+          </p:cNvPr>
+          <p:cNvPicPr>
+            <a:picLocks noChangeAspect="1"/>
+          </p:cNvPicPr>
+          <p:nvPr/>
+        </p:nvPicPr>
+        <p:blipFill>
+          <a:blip r:embed="rId2"/>
+          <a:stretch>
+            <a:fillRect/>
+          </a:stretch>
+        </p:blipFill>
+        <p:spPr>
+          <a:xfrm>
+            <a:off x="165100" y="1464163"/>
+            <a:ext cx="3985375" cy="864819"/>
+          </a:xfrm>
+          <a:prstGeom prst="rect">
+            <a:avLst/>
+          </a:prstGeom>
+        </p:spPr>
+      </p:pic>
+      <p:pic>
+        <p:nvPicPr>
+          <p:cNvPr id="7" name="Picture 6" descr="A screenshot of a computer&#10;&#10;AI-generated content may be incorrect.">
+            <a:extLst>
+              <a:ext uri="{FF2B5EF4-FFF2-40B4-BE49-F238E27FC236}">
+                <a16:creationId xmlns:a16="http://schemas.microsoft.com/office/drawing/2014/main" id="{C67FF10C-8F2D-9C32-3A3E-A6010D37625B}"/>
+              </a:ext>
+            </a:extLst>
+          </p:cNvPr>
+          <p:cNvPicPr>
+            <a:picLocks noChangeAspect="1"/>
+          </p:cNvPicPr>
+          <p:nvPr/>
+        </p:nvPicPr>
+        <p:blipFill>
+          <a:blip r:embed="rId3"/>
+          <a:stretch>
+            <a:fillRect/>
+          </a:stretch>
+        </p:blipFill>
+        <p:spPr>
+          <a:xfrm>
+            <a:off x="4405745" y="930533"/>
+            <a:ext cx="4051539" cy="3912248"/>
+          </a:xfrm>
+          <a:prstGeom prst="rect">
+            <a:avLst/>
+          </a:prstGeom>
+        </p:spPr>
+      </p:pic>
+    </p:spTree>
+    <p:extLst>
+      <p:ext uri="{BB962C8B-B14F-4D97-AF65-F5344CB8AC3E}">
+        <p14:creationId xmlns:p14="http://schemas.microsoft.com/office/powerpoint/2010/main" val="222366001"/>
+      </p:ext>
+    </p:extLst>
+  </p:cSld>
+  <p:clrMapOvr>
+    <a:masterClrMapping/>
+  </p:clrMapOvr>
+</p:sld>
+</file>
+
+<file path=ppt/slides/slide18.xml><?xml version="1.0" encoding="utf-8"?>
+<p:sld xmlns:a="http://schemas.openxmlformats.org/drawingml/2006/main" xmlns:r="http://schemas.openxmlformats.org/officeDocument/2006/relationships" xmlns:p="http://schemas.openxmlformats.org/presentationml/2006/main">
+  <p:cSld>
+    <p:spTree>
+      <p:nvGrpSpPr>
         <p:cNvPr id="1" name=""/>
         <p:cNvGrpSpPr/>
         <p:nvPr/>
@@ -12409,7 +13440,7 @@
 </p:sld>
 </file>
 
-<file path=ppt/slides/slide16.xml><?xml version="1.0" encoding="utf-8"?>
+<file path=ppt/slides/slide19.xml><?xml version="1.0" encoding="utf-8"?>
 <p:sld xmlns:a="http://schemas.openxmlformats.org/drawingml/2006/main" xmlns:r="http://schemas.openxmlformats.org/officeDocument/2006/relationships" xmlns:p="http://schemas.openxmlformats.org/presentationml/2006/main">
   <p:cSld>
     <p:spTree>
@@ -15801,15 +16832,6 @@
 </file>
 
 <file path=customXml/item1.xml><?xml version="1.0" encoding="utf-8"?>
-<p:properties xmlns:p="http://schemas.microsoft.com/office/2006/metadata/properties" xmlns:xsi="http://www.w3.org/2001/XMLSchema-instance" xmlns:pc="http://schemas.microsoft.com/office/infopath/2007/PartnerControls">
-  <documentManagement>
-    <PublishingExpirationDate xmlns="http://schemas.microsoft.com/sharepoint/v3" xsi:nil="true"/>
-    <PublishingStartDate xmlns="http://schemas.microsoft.com/sharepoint/v3" xsi:nil="true"/>
-  </documentManagement>
-</p:properties>
-</file>
-
-<file path=customXml/item2.xml><?xml version="1.0" encoding="utf-8"?>
 <ct:contentTypeSchema xmlns:ct="http://schemas.microsoft.com/office/2006/metadata/contentType" xmlns:ma="http://schemas.microsoft.com/office/2006/metadata/properties/metaAttributes" ct:_="" ma:_="" ma:contentTypeName="Document" ma:contentTypeID="0x010100FAE8EF9B5484074A9AD6AE3ECE890B10" ma:contentTypeVersion="1" ma:contentTypeDescription="Create a new document." ma:contentTypeScope="" ma:versionID="e3ebee926d0fba3772ddfd6cf3762369">
   <xsd:schema xmlns:xsd="http://www.w3.org/2001/XMLSchema" xmlns:xs="http://www.w3.org/2001/XMLSchema" xmlns:p="http://schemas.microsoft.com/office/2006/metadata/properties" xmlns:ns1="http://schemas.microsoft.com/sharepoint/v3" targetNamespace="http://schemas.microsoft.com/office/2006/metadata/properties" ma:root="true" ma:fieldsID="a447206dab0015f8b9f8924535193e8c" ns1:_="">
     <xsd:import namespace="http://schemas.microsoft.com/sharepoint/v3"/>
@@ -15941,6 +16963,15 @@
 </ct:contentTypeSchema>
 </file>
 
+<file path=customXml/item2.xml><?xml version="1.0" encoding="utf-8"?>
+<p:properties xmlns:p="http://schemas.microsoft.com/office/2006/metadata/properties" xmlns:xsi="http://www.w3.org/2001/XMLSchema-instance" xmlns:pc="http://schemas.microsoft.com/office/infopath/2007/PartnerControls">
+  <documentManagement>
+    <PublishingExpirationDate xmlns="http://schemas.microsoft.com/sharepoint/v3" xsi:nil="true"/>
+    <PublishingStartDate xmlns="http://schemas.microsoft.com/sharepoint/v3" xsi:nil="true"/>
+  </documentManagement>
+</p:properties>
+</file>
+
 <file path=customXml/item3.xml><?xml version="1.0" encoding="utf-8"?>
 <?mso-contentType ?>
 <FormTemplates xmlns="http://schemas.microsoft.com/sharepoint/v3/contenttype/forms">
@@ -15951,16 +16982,6 @@
 </file>
 
 <file path=customXml/itemProps1.xml><?xml version="1.0" encoding="utf-8"?>
-<ds:datastoreItem xmlns:ds="http://schemas.openxmlformats.org/officeDocument/2006/customXml" ds:itemID="{F2E3C980-C590-44A7-B970-BBC4E6ABA5CF}">
-  <ds:schemaRefs>
-    <ds:schemaRef ds:uri="http://schemas.microsoft.com/office/2006/metadata/properties"/>
-    <ds:schemaRef ds:uri="http://schemas.microsoft.com/office/infopath/2007/PartnerControls"/>
-    <ds:schemaRef ds:uri="http://schemas.microsoft.com/sharepoint/v3"/>
-  </ds:schemaRefs>
-</ds:datastoreItem>
-</file>
-
-<file path=customXml/itemProps2.xml><?xml version="1.0" encoding="utf-8"?>
 <ds:datastoreItem xmlns:ds="http://schemas.openxmlformats.org/officeDocument/2006/customXml" ds:itemID="{8F971539-B776-48D0-B41E-084723CFE5E8}">
   <ds:schemaRefs>
     <ds:schemaRef ds:uri="http://schemas.microsoft.com/office/2006/metadata/contentType"/>
@@ -15978,6 +16999,16 @@
 </ds:datastoreItem>
 </file>
 
+<file path=customXml/itemProps2.xml><?xml version="1.0" encoding="utf-8"?>
+<ds:datastoreItem xmlns:ds="http://schemas.openxmlformats.org/officeDocument/2006/customXml" ds:itemID="{F2E3C980-C590-44A7-B970-BBC4E6ABA5CF}">
+  <ds:schemaRefs>
+    <ds:schemaRef ds:uri="http://schemas.microsoft.com/office/2006/metadata/properties"/>
+    <ds:schemaRef ds:uri="http://schemas.microsoft.com/office/infopath/2007/PartnerControls"/>
+    <ds:schemaRef ds:uri="http://schemas.microsoft.com/sharepoint/v3"/>
+  </ds:schemaRefs>
+</ds:datastoreItem>
+</file>
+
 <file path=customXml/itemProps3.xml><?xml version="1.0" encoding="utf-8"?>
 <ds:datastoreItem xmlns:ds="http://schemas.openxmlformats.org/officeDocument/2006/customXml" ds:itemID="{F845859A-C588-4588-AB1B-0F629E367C93}">
   <ds:schemaRefs>

</xml_diff>

<commit_message>
Update 3A - Multigroup comparisons.pptx
</commit_message>
<xml_diff>
--- a/Presentations/3A - Multigroup comparisons.pptx
+++ b/Presentations/3A - Multigroup comparisons.pptx
@@ -239,7 +239,7 @@
               <a:rPr lang="en-US" smtClean="0">
                 <a:latin typeface="Arial"/>
               </a:rPr>
-              <a:t>1/16/25</a:t>
+              <a:t>1/17/25</a:t>
             </a:fld>
             <a:endParaRPr lang="en-US" dirty="0">
               <a:latin typeface="Arial"/>
@@ -418,7 +418,7 @@
             <a:fld id="{D0B6771E-1346-9143-B102-CAB35990CCFA}" type="datetimeFigureOut">
               <a:rPr lang="en-US" smtClean="0"/>
               <a:pPr/>
-              <a:t>1/16/25</a:t>
+              <a:t>1/17/25</a:t>
             </a:fld>
             <a:endParaRPr lang="en-US" dirty="0"/>
           </a:p>
@@ -12402,7 +12402,7 @@
           <p:nvPr>
             <p:extLst>
               <p:ext uri="{D42A27DB-BD31-4B8C-83A1-F6EECF244321}">
-                <p14:modId xmlns:p14="http://schemas.microsoft.com/office/powerpoint/2010/main" val="3985296302"/>
+                <p14:modId xmlns:p14="http://schemas.microsoft.com/office/powerpoint/2010/main" val="1314095013"/>
               </p:ext>
             </p:extLst>
           </p:nvPr>
@@ -12461,7 +12461,10 @@
                     <a:lstStyle/>
                     <a:p>
                       <a:pPr algn="ctr"/>
-                      <a:endParaRPr lang="en-US" dirty="0"/>
+                      <a:r>
+                        <a:rPr lang="en-US" dirty="0"/>
+                        <a:t>BMI categories</a:t>
+                      </a:r>
                     </a:p>
                   </a:txBody>
                   <a:tcPr anchor="ctr"/>
@@ -13330,7 +13333,7 @@
         <p:spPr>
           <a:xfrm>
             <a:off x="304800" y="1158508"/>
-            <a:ext cx="6896100" cy="1400383"/>
+            <a:ext cx="6896100" cy="2092881"/>
           </a:xfrm>
           <a:prstGeom prst="rect">
             <a:avLst/>
@@ -13376,6 +13379,24 @@
                 <a:cs typeface="Arial" panose="020B0604020202020204" pitchFamily="34" charset="0"/>
               </a:rPr>
               <a:t>Kruskal-Wallis is used for continuous data that are non-parametric for multigroup comparisons</a:t>
+            </a:r>
+          </a:p>
+          <a:p>
+            <a:pPr marL="0" indent="0">
+              <a:spcAft>
+                <a:spcPts val="600"/>
+              </a:spcAft>
+              <a:buNone/>
+            </a:pPr>
+            <a:r>
+              <a:rPr lang="en-US" sz="2000" dirty="0">
+                <a:solidFill>
+                  <a:schemeClr val="bg1"/>
+                </a:solidFill>
+                <a:latin typeface="Arial Nova" panose="020B0504020202020204" pitchFamily="34" charset="0"/>
+                <a:cs typeface="Arial" panose="020B0604020202020204" pitchFamily="34" charset="0"/>
+              </a:rPr>
+              <a:t>R x C analysis allows you to make comparisons with three or more categories</a:t>
             </a:r>
             <a:endParaRPr lang="en-US" dirty="0">
               <a:solidFill>
@@ -16832,6 +16853,15 @@
 </file>
 
 <file path=customXml/item1.xml><?xml version="1.0" encoding="utf-8"?>
+<p:properties xmlns:p="http://schemas.microsoft.com/office/2006/metadata/properties" xmlns:xsi="http://www.w3.org/2001/XMLSchema-instance" xmlns:pc="http://schemas.microsoft.com/office/infopath/2007/PartnerControls">
+  <documentManagement>
+    <PublishingExpirationDate xmlns="http://schemas.microsoft.com/sharepoint/v3" xsi:nil="true"/>
+    <PublishingStartDate xmlns="http://schemas.microsoft.com/sharepoint/v3" xsi:nil="true"/>
+  </documentManagement>
+</p:properties>
+</file>
+
+<file path=customXml/item2.xml><?xml version="1.0" encoding="utf-8"?>
 <ct:contentTypeSchema xmlns:ct="http://schemas.microsoft.com/office/2006/metadata/contentType" xmlns:ma="http://schemas.microsoft.com/office/2006/metadata/properties/metaAttributes" ct:_="" ma:_="" ma:contentTypeName="Document" ma:contentTypeID="0x010100FAE8EF9B5484074A9AD6AE3ECE890B10" ma:contentTypeVersion="1" ma:contentTypeDescription="Create a new document." ma:contentTypeScope="" ma:versionID="e3ebee926d0fba3772ddfd6cf3762369">
   <xsd:schema xmlns:xsd="http://www.w3.org/2001/XMLSchema" xmlns:xs="http://www.w3.org/2001/XMLSchema" xmlns:p="http://schemas.microsoft.com/office/2006/metadata/properties" xmlns:ns1="http://schemas.microsoft.com/sharepoint/v3" targetNamespace="http://schemas.microsoft.com/office/2006/metadata/properties" ma:root="true" ma:fieldsID="a447206dab0015f8b9f8924535193e8c" ns1:_="">
     <xsd:import namespace="http://schemas.microsoft.com/sharepoint/v3"/>
@@ -16963,15 +16993,6 @@
 </ct:contentTypeSchema>
 </file>
 
-<file path=customXml/item2.xml><?xml version="1.0" encoding="utf-8"?>
-<p:properties xmlns:p="http://schemas.microsoft.com/office/2006/metadata/properties" xmlns:xsi="http://www.w3.org/2001/XMLSchema-instance" xmlns:pc="http://schemas.microsoft.com/office/infopath/2007/PartnerControls">
-  <documentManagement>
-    <PublishingExpirationDate xmlns="http://schemas.microsoft.com/sharepoint/v3" xsi:nil="true"/>
-    <PublishingStartDate xmlns="http://schemas.microsoft.com/sharepoint/v3" xsi:nil="true"/>
-  </documentManagement>
-</p:properties>
-</file>
-
 <file path=customXml/item3.xml><?xml version="1.0" encoding="utf-8"?>
 <?mso-contentType ?>
 <FormTemplates xmlns="http://schemas.microsoft.com/sharepoint/v3/contenttype/forms">
@@ -16982,6 +17003,16 @@
 </file>
 
 <file path=customXml/itemProps1.xml><?xml version="1.0" encoding="utf-8"?>
+<ds:datastoreItem xmlns:ds="http://schemas.openxmlformats.org/officeDocument/2006/customXml" ds:itemID="{F2E3C980-C590-44A7-B970-BBC4E6ABA5CF}">
+  <ds:schemaRefs>
+    <ds:schemaRef ds:uri="http://schemas.microsoft.com/office/2006/metadata/properties"/>
+    <ds:schemaRef ds:uri="http://schemas.microsoft.com/office/infopath/2007/PartnerControls"/>
+    <ds:schemaRef ds:uri="http://schemas.microsoft.com/sharepoint/v3"/>
+  </ds:schemaRefs>
+</ds:datastoreItem>
+</file>
+
+<file path=customXml/itemProps2.xml><?xml version="1.0" encoding="utf-8"?>
 <ds:datastoreItem xmlns:ds="http://schemas.openxmlformats.org/officeDocument/2006/customXml" ds:itemID="{8F971539-B776-48D0-B41E-084723CFE5E8}">
   <ds:schemaRefs>
     <ds:schemaRef ds:uri="http://schemas.microsoft.com/office/2006/metadata/contentType"/>
@@ -16999,16 +17030,6 @@
 </ds:datastoreItem>
 </file>
 
-<file path=customXml/itemProps2.xml><?xml version="1.0" encoding="utf-8"?>
-<ds:datastoreItem xmlns:ds="http://schemas.openxmlformats.org/officeDocument/2006/customXml" ds:itemID="{F2E3C980-C590-44A7-B970-BBC4E6ABA5CF}">
-  <ds:schemaRefs>
-    <ds:schemaRef ds:uri="http://schemas.microsoft.com/office/2006/metadata/properties"/>
-    <ds:schemaRef ds:uri="http://schemas.microsoft.com/office/infopath/2007/PartnerControls"/>
-    <ds:schemaRef ds:uri="http://schemas.microsoft.com/sharepoint/v3"/>
-  </ds:schemaRefs>
-</ds:datastoreItem>
-</file>
-
 <file path=customXml/itemProps3.xml><?xml version="1.0" encoding="utf-8"?>
 <ds:datastoreItem xmlns:ds="http://schemas.openxmlformats.org/officeDocument/2006/customXml" ds:itemID="{F845859A-C588-4588-AB1B-0F629E367C93}">
   <ds:schemaRefs>

</xml_diff>